<commit_message>
updated code and ppt
</commit_message>
<xml_diff>
--- a/documents/SafeGraph 1015 presentation.pptx
+++ b/documents/SafeGraph 1015 presentation.pptx
@@ -12474,8 +12474,8 @@
         </p:nvSpPr>
         <p:spPr>
           <a:xfrm>
-            <a:off x="1143000" y="1856500"/>
-            <a:ext cx="3198600" cy="252600"/>
+            <a:off x="677491" y="1190870"/>
+            <a:ext cx="3571780" cy="2641542"/>
           </a:xfrm>
           <a:prstGeom prst="rect">
             <a:avLst/>
@@ -12497,10 +12497,10 @@
               <a:buNone/>
             </a:pPr>
             <a:r>
-              <a:rPr lang="en"/>
-              <a:t>An interesting statement that accompanies an image would work well here.</a:t>
+              <a:rPr lang="en" dirty="0"/>
+              <a:t>Median income for gas station customers had decreases in 8 of top 10 counties in GA between 7/19 and 7/21.</a:t>
             </a:r>
-            <a:endParaRPr/>
+            <a:endParaRPr dirty="0"/>
           </a:p>
         </p:txBody>
       </p:sp>
@@ -12572,7 +12572,7 @@
         <p:spPr>
           <a:xfrm>
             <a:off x="751114" y="1233503"/>
-            <a:ext cx="3198600" cy="252600"/>
+            <a:ext cx="2852698" cy="2612356"/>
           </a:xfrm>
           <a:prstGeom prst="rect">
             <a:avLst/>
@@ -12595,11 +12595,7 @@
             </a:pPr>
             <a:r>
               <a:rPr lang="en-US" dirty="0"/>
-              <a:t>A</a:t>
-            </a:r>
-            <a:r>
-              <a:rPr lang="en" dirty="0"/>
-              <a:t>ge comment</a:t>
+              <a:t>Median age had no abnormal shift between 7/19 and 7/21.  </a:t>
             </a:r>
             <a:endParaRPr dirty="0"/>
           </a:p>
@@ -12607,10 +12603,10 @@
       </p:sp>
       <p:pic>
         <p:nvPicPr>
-          <p:cNvPr id="7" name="Picture 6">
+          <p:cNvPr id="3" name="Picture 2">
             <a:extLst>
               <a:ext uri="{FF2B5EF4-FFF2-40B4-BE49-F238E27FC236}">
-                <a16:creationId xmlns:a16="http://schemas.microsoft.com/office/drawing/2014/main" id="{653EA185-81A2-4DD0-8C47-152BE78AA683}"/>
+                <a16:creationId xmlns:a16="http://schemas.microsoft.com/office/drawing/2014/main" id="{4CE82FDE-34AB-484F-8290-918BD6E3E7AD}"/>
               </a:ext>
             </a:extLst>
           </p:cNvPr>
@@ -12627,8 +12623,8 @@
         </p:blipFill>
         <p:spPr>
           <a:xfrm>
-            <a:off x="3818374" y="401783"/>
-            <a:ext cx="4648135" cy="4114800"/>
+            <a:off x="3718111" y="780932"/>
+            <a:ext cx="4755457" cy="3330242"/>
           </a:xfrm>
           <a:prstGeom prst="rect">
             <a:avLst/>
@@ -12677,8 +12673,8 @@
         </p:nvSpPr>
         <p:spPr>
           <a:xfrm>
-            <a:off x="751114" y="1233503"/>
-            <a:ext cx="2926583" cy="252600"/>
+            <a:off x="751114" y="1233502"/>
+            <a:ext cx="2926583" cy="2619079"/>
           </a:xfrm>
           <a:prstGeom prst="rect">
             <a:avLst/>

</xml_diff>